<commit_message>
+ button creates a new empty page2
</commit_message>
<xml_diff>
--- a/TravelGuide.pptx
+++ b/TravelGuide.pptx
@@ -8,6 +8,7 @@
     <p:sldId id="256" r:id="rId2"/>
     <p:sldId id="257" r:id="rId3"/>
     <p:sldId id="258" r:id="rId4"/>
+    <p:sldId id="259" r:id="rId5"/>
   </p:sldIdLst>
   <p:sldSz cx="12192000" cy="6858000"/>
   <p:notesSz cx="6858000" cy="9144000"/>
@@ -2472,7 +2473,7 @@
           <a:p>
             <a:fld id="{3C04E684-10F4-4CC3-A0B9-F03AA7BE37CF}" type="datetimeFigureOut">
               <a:rPr lang="en-US" smtClean="0"/>
-              <a:t>02-Apr-23</a:t>
+              <a:t>4/2/23</a:t>
             </a:fld>
             <a:endParaRPr lang="en-US"/>
           </a:p>
@@ -4962,7 +4963,7 @@
           <a:p>
             <a:fld id="{3C04E684-10F4-4CC3-A0B9-F03AA7BE37CF}" type="datetimeFigureOut">
               <a:rPr lang="en-US" smtClean="0"/>
-              <a:t>02-Apr-23</a:t>
+              <a:t>4/2/23</a:t>
             </a:fld>
             <a:endParaRPr lang="en-US"/>
           </a:p>
@@ -5160,7 +5161,7 @@
           <a:p>
             <a:fld id="{3C04E684-10F4-4CC3-A0B9-F03AA7BE37CF}" type="datetimeFigureOut">
               <a:rPr lang="en-US" smtClean="0"/>
-              <a:t>02-Apr-23</a:t>
+              <a:t>4/2/23</a:t>
             </a:fld>
             <a:endParaRPr lang="en-US"/>
           </a:p>
@@ -5368,7 +5369,7 @@
           <a:p>
             <a:fld id="{3C04E684-10F4-4CC3-A0B9-F03AA7BE37CF}" type="datetimeFigureOut">
               <a:rPr lang="en-US" smtClean="0"/>
-              <a:t>02-Apr-23</a:t>
+              <a:t>4/2/23</a:t>
             </a:fld>
             <a:endParaRPr lang="en-US"/>
           </a:p>
@@ -6105,7 +6106,7 @@
           <a:p>
             <a:fld id="{3C04E684-10F4-4CC3-A0B9-F03AA7BE37CF}" type="datetimeFigureOut">
               <a:rPr lang="en-US" smtClean="0"/>
-              <a:t>02-Apr-23</a:t>
+              <a:t>4/2/23</a:t>
             </a:fld>
             <a:endParaRPr lang="en-US"/>
           </a:p>
@@ -6747,7 +6748,7 @@
           <a:p>
             <a:fld id="{3C04E684-10F4-4CC3-A0B9-F03AA7BE37CF}" type="datetimeFigureOut">
               <a:rPr lang="en-US" smtClean="0"/>
-              <a:t>02-Apr-23</a:t>
+              <a:t>4/2/23</a:t>
             </a:fld>
             <a:endParaRPr lang="en-US"/>
           </a:p>
@@ -7547,7 +7548,7 @@
           <a:p>
             <a:fld id="{3C04E684-10F4-4CC3-A0B9-F03AA7BE37CF}" type="datetimeFigureOut">
               <a:rPr lang="en-US" smtClean="0"/>
-              <a:t>02-Apr-23</a:t>
+              <a:t>4/2/23</a:t>
             </a:fld>
             <a:endParaRPr lang="en-US"/>
           </a:p>
@@ -8498,7 +8499,7 @@
           <a:p>
             <a:fld id="{3C04E684-10F4-4CC3-A0B9-F03AA7BE37CF}" type="datetimeFigureOut">
               <a:rPr lang="en-US" smtClean="0"/>
-              <a:t>02-Apr-23</a:t>
+              <a:t>4/2/23</a:t>
             </a:fld>
             <a:endParaRPr lang="en-US"/>
           </a:p>
@@ -10847,7 +10848,7 @@
           <a:p>
             <a:fld id="{3C04E684-10F4-4CC3-A0B9-F03AA7BE37CF}" type="datetimeFigureOut">
               <a:rPr lang="en-US" smtClean="0"/>
-              <a:t>02-Apr-23</a:t>
+              <a:t>4/2/23</a:t>
             </a:fld>
             <a:endParaRPr lang="en-US"/>
           </a:p>
@@ -10960,7 +10961,7 @@
           <a:p>
             <a:fld id="{3C04E684-10F4-4CC3-A0B9-F03AA7BE37CF}" type="datetimeFigureOut">
               <a:rPr lang="en-US" smtClean="0"/>
-              <a:t>02-Apr-23</a:t>
+              <a:t>4/2/23</a:t>
             </a:fld>
             <a:endParaRPr lang="en-US"/>
           </a:p>
@@ -11467,7 +11468,7 @@
           <a:p>
             <a:fld id="{3C04E684-10F4-4CC3-A0B9-F03AA7BE37CF}" type="datetimeFigureOut">
               <a:rPr lang="en-US" smtClean="0"/>
-              <a:t>02-Apr-23</a:t>
+              <a:t>4/2/23</a:t>
             </a:fld>
             <a:endParaRPr lang="en-US"/>
           </a:p>
@@ -12770,7 +12771,7 @@
           <a:p>
             <a:fld id="{3C04E684-10F4-4CC3-A0B9-F03AA7BE37CF}" type="datetimeFigureOut">
               <a:rPr lang="en-US" smtClean="0"/>
-              <a:t>02-Apr-23</a:t>
+              <a:t>4/2/23</a:t>
             </a:fld>
             <a:endParaRPr lang="en-US"/>
           </a:p>
@@ -13017,7 +13018,7 @@
           <a:p>
             <a:fld id="{3C04E684-10F4-4CC3-A0B9-F03AA7BE37CF}" type="datetimeFigureOut">
               <a:rPr lang="en-US" smtClean="0"/>
-              <a:t>02-Apr-23</a:t>
+              <a:t>4/2/23</a:t>
             </a:fld>
             <a:endParaRPr lang="en-US"/>
           </a:p>
@@ -16009,8 +16010,8 @@
         </p:nvSpPr>
         <p:spPr>
           <a:xfrm>
-            <a:off x="798990" y="603682"/>
-            <a:ext cx="9507985" cy="4438835"/>
+            <a:off x="1391478" y="1898374"/>
+            <a:ext cx="9153939" cy="2966882"/>
           </a:xfrm>
         </p:spPr>
         <p:txBody>
@@ -18016,6 +18017,123 @@
 </p:sld>
 </file>
 
+<file path=ppt/slides/slide4.xml><?xml version="1.0" encoding="utf-8"?>
+<p:sld xmlns:a="http://schemas.openxmlformats.org/drawingml/2006/main" xmlns:r="http://schemas.openxmlformats.org/officeDocument/2006/relationships" xmlns:p="http://schemas.openxmlformats.org/presentationml/2006/main">
+  <p:cSld>
+    <p:spTree>
+      <p:nvGrpSpPr>
+        <p:cNvPr id="1" name=""/>
+        <p:cNvGrpSpPr/>
+        <p:nvPr/>
+      </p:nvGrpSpPr>
+      <p:grpSpPr>
+        <a:xfrm>
+          <a:off x="0" y="0"/>
+          <a:ext cx="0" cy="0"/>
+          <a:chOff x="0" y="0"/>
+          <a:chExt cx="0" cy="0"/>
+        </a:xfrm>
+      </p:grpSpPr>
+      <p:sp>
+        <p:nvSpPr>
+          <p:cNvPr id="2" name="Title 1">
+            <a:extLst>
+              <a:ext uri="{FF2B5EF4-FFF2-40B4-BE49-F238E27FC236}">
+                <a16:creationId xmlns:a16="http://schemas.microsoft.com/office/drawing/2014/main" id="{6AC7C699-BBD1-C0EF-52A0-4C0B4B56257F}"/>
+              </a:ext>
+            </a:extLst>
+          </p:cNvPr>
+          <p:cNvSpPr>
+            <a:spLocks noGrp="1"/>
+          </p:cNvSpPr>
+          <p:nvPr>
+            <p:ph type="title"/>
+          </p:nvPr>
+        </p:nvSpPr>
+        <p:spPr/>
+        <p:txBody>
+          <a:bodyPr/>
+          <a:lstStyle/>
+          <a:p>
+            <a:endParaRPr lang="en-GR" dirty="0"/>
+          </a:p>
+        </p:txBody>
+      </p:sp>
+      <p:sp>
+        <p:nvSpPr>
+          <p:cNvPr id="3" name="Content Placeholder 2">
+            <a:extLst>
+              <a:ext uri="{FF2B5EF4-FFF2-40B4-BE49-F238E27FC236}">
+                <a16:creationId xmlns:a16="http://schemas.microsoft.com/office/drawing/2014/main" id="{D56823D4-5BC3-B4F4-B67D-B7FE5D6E58DF}"/>
+              </a:ext>
+            </a:extLst>
+          </p:cNvPr>
+          <p:cNvSpPr>
+            <a:spLocks noGrp="1"/>
+          </p:cNvSpPr>
+          <p:nvPr>
+            <p:ph idx="1"/>
+          </p:nvPr>
+        </p:nvSpPr>
+        <p:spPr/>
+        <p:txBody>
+          <a:bodyPr>
+            <a:normAutofit/>
+          </a:bodyPr>
+          <a:lstStyle/>
+          <a:p>
+            <a:pPr marL="0" indent="0">
+              <a:buNone/>
+            </a:pPr>
+            <a:r>
+              <a:rPr lang="en-GB" sz="2000" dirty="0"/>
+              <a:t>https://</a:t>
+            </a:r>
+            <a:r>
+              <a:rPr lang="en-GB" sz="2000" dirty="0" err="1"/>
+              <a:t>eefthymiou.github.io</a:t>
+            </a:r>
+            <a:r>
+              <a:rPr lang="en-GB" sz="2000" dirty="0"/>
+              <a:t>/</a:t>
+            </a:r>
+            <a:r>
+              <a:rPr lang="en-GB" sz="2000" dirty="0" err="1"/>
+              <a:t>TravelGuide</a:t>
+            </a:r>
+            <a:r>
+              <a:rPr lang="en-GB" sz="2000" dirty="0"/>
+              <a:t>/</a:t>
+            </a:r>
+            <a:r>
+              <a:rPr lang="en-GB" sz="2000" dirty="0" err="1"/>
+              <a:t>mainpage</a:t>
+            </a:r>
+            <a:r>
+              <a:rPr lang="en-GB" sz="2000" dirty="0"/>
+              <a:t>/</a:t>
+            </a:r>
+            <a:r>
+              <a:rPr lang="en-GB" sz="2000" dirty="0" err="1"/>
+              <a:t>mainpage.html</a:t>
+            </a:r>
+            <a:endParaRPr lang="en-GR" sz="2000" dirty="0"/>
+          </a:p>
+        </p:txBody>
+      </p:sp>
+    </p:spTree>
+    <p:extLst>
+      <p:ext uri="{BB962C8B-B14F-4D97-AF65-F5344CB8AC3E}">
+        <p14:creationId xmlns:p14="http://schemas.microsoft.com/office/powerpoint/2010/main" val="3217599258"/>
+      </p:ext>
+    </p:extLst>
+  </p:cSld>
+  <p:clrMapOvr>
+    <a:masterClrMapping/>
+  </p:clrMapOvr>
+</p:sld>
+</file>
+
 <file path=ppt/theme/theme1.xml><?xml version="1.0" encoding="utf-8"?>
 <a:theme xmlns:a="http://schemas.openxmlformats.org/drawingml/2006/main" name="BrushVTI">
   <a:themeElements>

</xml_diff>